<commit_message>
clicks_ratio = clicks/views (no sqrt)
</commit_message>
<xml_diff>
--- a/Taboola project.pptx
+++ b/Taboola project.pptx
@@ -27,7 +27,8 @@
     <p:sldId id="279" r:id="rId21"/>
     <p:sldId id="280" r:id="rId22"/>
     <p:sldId id="281" r:id="rId23"/>
-    <p:sldId id="278" r:id="rId24"/>
+    <p:sldId id="282" r:id="rId24"/>
+    <p:sldId id="278" r:id="rId25"/>
   </p:sldIdLst>
   <p:sldSz cx="12192000" cy="6858000"/>
   <p:notesSz cx="6858000" cy="9144000"/>
@@ -6174,14 +6175,14 @@
           <p:nvPr>
             <p:extLst>
               <p:ext uri="{D42A27DB-BD31-4B8C-83A1-F6EECF244321}">
-                <p14:modId xmlns:p14="http://schemas.microsoft.com/office/powerpoint/2010/main" val="2816863580"/>
+                <p14:modId xmlns:p14="http://schemas.microsoft.com/office/powerpoint/2010/main" val="2459463658"/>
               </p:ext>
             </p:extLst>
           </p:nvPr>
         </p:nvGraphicFramePr>
         <p:xfrm>
           <a:off x="818609" y="2786089"/>
-          <a:ext cx="4249780" cy="2341245"/>
+          <a:ext cx="4328157" cy="2408574"/>
         </p:xfrm>
         <a:graphic>
           <a:graphicData uri="http://schemas.openxmlformats.org/drawingml/2006/table">
@@ -6190,35 +6191,35 @@
                 <a:tableStyleId>{5C22544A-7EE6-4342-B048-85BDC9FD1C3A}</a:tableStyleId>
               </a:tblPr>
               <a:tblGrid>
-                <a:gridCol w="785675">
+                <a:gridCol w="931814">
                   <a:extLst>
                     <a:ext uri="{9D8B030D-6E8A-4147-A177-3AD203B41FA5}">
                       <a16:colId xmlns:a16="http://schemas.microsoft.com/office/drawing/2014/main" val="2526395775"/>
                     </a:ext>
                   </a:extLst>
                 </a:gridCol>
-                <a:gridCol w="690440">
+                <a:gridCol w="757646">
                   <a:extLst>
                     <a:ext uri="{9D8B030D-6E8A-4147-A177-3AD203B41FA5}">
                       <a16:colId xmlns:a16="http://schemas.microsoft.com/office/drawing/2014/main" val="315955252"/>
                     </a:ext>
                   </a:extLst>
                 </a:gridCol>
-                <a:gridCol w="749962">
+                <a:gridCol w="718457">
                   <a:extLst>
                     <a:ext uri="{9D8B030D-6E8A-4147-A177-3AD203B41FA5}">
                       <a16:colId xmlns:a16="http://schemas.microsoft.com/office/drawing/2014/main" val="4228990036"/>
                     </a:ext>
                   </a:extLst>
                 </a:gridCol>
-                <a:gridCol w="1043988">
+                <a:gridCol w="927463">
                   <a:extLst>
                     <a:ext uri="{9D8B030D-6E8A-4147-A177-3AD203B41FA5}">
                       <a16:colId xmlns:a16="http://schemas.microsoft.com/office/drawing/2014/main" val="1645897651"/>
                     </a:ext>
                   </a:extLst>
                 </a:gridCol>
-                <a:gridCol w="979715">
+                <a:gridCol w="992777">
                   <a:extLst>
                     <a:ext uri="{9D8B030D-6E8A-4147-A177-3AD203B41FA5}">
                       <a16:colId xmlns:a16="http://schemas.microsoft.com/office/drawing/2014/main" val="2170248187"/>
@@ -6348,7 +6349,7 @@
                   </a:ext>
                 </a:extLst>
               </a:tr>
-              <a:tr h="190500">
+              <a:tr h="202584">
                 <a:tc>
                   <a:txBody>
                     <a:bodyPr/>
@@ -6470,7 +6471,7 @@
                   </a:ext>
                 </a:extLst>
               </a:tr>
-              <a:tr h="190500">
+              <a:tr h="245745">
                 <a:tc>
                   <a:txBody>
                     <a:bodyPr/>
@@ -7587,14 +7588,14 @@
           <p:nvPr>
             <p:extLst>
               <p:ext uri="{D42A27DB-BD31-4B8C-83A1-F6EECF244321}">
-                <p14:modId xmlns:p14="http://schemas.microsoft.com/office/powerpoint/2010/main" val="1252894930"/>
+                <p14:modId xmlns:p14="http://schemas.microsoft.com/office/powerpoint/2010/main" val="944962498"/>
               </p:ext>
             </p:extLst>
           </p:nvPr>
         </p:nvGraphicFramePr>
         <p:xfrm>
           <a:off x="6502289" y="2786089"/>
-          <a:ext cx="4406900" cy="2403131"/>
+          <a:ext cx="3961060" cy="2403131"/>
         </p:xfrm>
         <a:graphic>
           <a:graphicData uri="http://schemas.openxmlformats.org/drawingml/2006/table">
@@ -7617,14 +7618,14 @@
                     </a:ext>
                   </a:extLst>
                 </a:gridCol>
-                <a:gridCol w="1323022">
+                <a:gridCol w="1113557">
                   <a:extLst>
                     <a:ext uri="{9D8B030D-6E8A-4147-A177-3AD203B41FA5}">
                       <a16:colId xmlns:a16="http://schemas.microsoft.com/office/drawing/2014/main" val="340182992"/>
                     </a:ext>
                   </a:extLst>
                 </a:gridCol>
-                <a:gridCol w="1294467">
+                <a:gridCol w="1058092">
                   <a:extLst>
                     <a:ext uri="{9D8B030D-6E8A-4147-A177-3AD203B41FA5}">
                       <a16:colId xmlns:a16="http://schemas.microsoft.com/office/drawing/2014/main" val="3061294601"/>
@@ -8774,7 +8775,7 @@
         </p:nvSpPr>
         <p:spPr>
           <a:xfrm>
-            <a:off x="7726024" y="2259958"/>
+            <a:off x="8039533" y="2121408"/>
             <a:ext cx="1959429" cy="369332"/>
           </a:xfrm>
           <a:prstGeom prst="rect">
@@ -9072,14 +9073,14 @@
           <p:nvPr>
             <p:extLst>
               <p:ext uri="{D42A27DB-BD31-4B8C-83A1-F6EECF244321}">
-                <p14:modId xmlns:p14="http://schemas.microsoft.com/office/powerpoint/2010/main" val="1987589568"/>
+                <p14:modId xmlns:p14="http://schemas.microsoft.com/office/powerpoint/2010/main" val="1436829987"/>
               </p:ext>
             </p:extLst>
           </p:nvPr>
         </p:nvGraphicFramePr>
         <p:xfrm>
           <a:off x="818609" y="2786089"/>
-          <a:ext cx="3270065" cy="2327910"/>
+          <a:ext cx="3492134" cy="2327910"/>
         </p:xfrm>
         <a:graphic>
           <a:graphicData uri="http://schemas.openxmlformats.org/drawingml/2006/table">
@@ -9088,28 +9089,28 @@
                 <a:tableStyleId>{5C22544A-7EE6-4342-B048-85BDC9FD1C3A}</a:tableStyleId>
               </a:tblPr>
               <a:tblGrid>
-                <a:gridCol w="785675">
+                <a:gridCol w="866500">
                   <a:extLst>
                     <a:ext uri="{9D8B030D-6E8A-4147-A177-3AD203B41FA5}">
                       <a16:colId xmlns:a16="http://schemas.microsoft.com/office/drawing/2014/main" val="2526395775"/>
                     </a:ext>
                   </a:extLst>
                 </a:gridCol>
-                <a:gridCol w="690440">
+                <a:gridCol w="718457">
                   <a:extLst>
                     <a:ext uri="{9D8B030D-6E8A-4147-A177-3AD203B41FA5}">
                       <a16:colId xmlns:a16="http://schemas.microsoft.com/office/drawing/2014/main" val="315955252"/>
                     </a:ext>
                   </a:extLst>
                 </a:gridCol>
-                <a:gridCol w="749962">
+                <a:gridCol w="796834">
                   <a:extLst>
                     <a:ext uri="{9D8B030D-6E8A-4147-A177-3AD203B41FA5}">
                       <a16:colId xmlns:a16="http://schemas.microsoft.com/office/drawing/2014/main" val="4228990036"/>
                     </a:ext>
                   </a:extLst>
                 </a:gridCol>
-                <a:gridCol w="1043988">
+                <a:gridCol w="1110343">
                   <a:extLst>
                     <a:ext uri="{9D8B030D-6E8A-4147-A177-3AD203B41FA5}">
                       <a16:colId xmlns:a16="http://schemas.microsoft.com/office/drawing/2014/main" val="1645897651"/>
@@ -10195,14 +10196,14 @@
           <p:nvPr>
             <p:extLst>
               <p:ext uri="{D42A27DB-BD31-4B8C-83A1-F6EECF244321}">
-                <p14:modId xmlns:p14="http://schemas.microsoft.com/office/powerpoint/2010/main" val="3276300950"/>
+                <p14:modId xmlns:p14="http://schemas.microsoft.com/office/powerpoint/2010/main" val="967386891"/>
               </p:ext>
             </p:extLst>
           </p:nvPr>
         </p:nvGraphicFramePr>
         <p:xfrm>
           <a:off x="6502289" y="2786089"/>
-          <a:ext cx="3112433" cy="2403131"/>
+          <a:ext cx="2876842" cy="2403131"/>
         </p:xfrm>
         <a:graphic>
           <a:graphicData uri="http://schemas.openxmlformats.org/drawingml/2006/table">
@@ -10225,7 +10226,7 @@
                     </a:ext>
                   </a:extLst>
                 </a:gridCol>
-                <a:gridCol w="1323022">
+                <a:gridCol w="1087431">
                   <a:extLst>
                     <a:ext uri="{9D8B030D-6E8A-4147-A177-3AD203B41FA5}">
                       <a16:colId xmlns:a16="http://schemas.microsoft.com/office/drawing/2014/main" val="340182992"/>
@@ -11092,7 +11093,7 @@
         </p:nvSpPr>
         <p:spPr>
           <a:xfrm>
-            <a:off x="7726024" y="2259958"/>
+            <a:off x="7276009" y="2109131"/>
             <a:ext cx="1959429" cy="369332"/>
           </a:xfrm>
           <a:prstGeom prst="rect">
@@ -11312,14 +11313,14 @@
           <p:nvPr>
             <p:extLst>
               <p:ext uri="{D42A27DB-BD31-4B8C-83A1-F6EECF244321}">
-                <p14:modId xmlns:p14="http://schemas.microsoft.com/office/powerpoint/2010/main" val="1809165030"/>
+                <p14:modId xmlns:p14="http://schemas.microsoft.com/office/powerpoint/2010/main" val="3961423117"/>
               </p:ext>
             </p:extLst>
           </p:nvPr>
         </p:nvGraphicFramePr>
         <p:xfrm>
           <a:off x="818609" y="2786089"/>
-          <a:ext cx="4170154" cy="2327910"/>
+          <a:ext cx="4249780" cy="2327910"/>
         </p:xfrm>
         <a:graphic>
           <a:graphicData uri="http://schemas.openxmlformats.org/drawingml/2006/table">
@@ -11335,28 +11336,28 @@
                     </a:ext>
                   </a:extLst>
                 </a:gridCol>
-                <a:gridCol w="667411">
+                <a:gridCol w="786300">
                   <a:extLst>
                     <a:ext uri="{9D8B030D-6E8A-4147-A177-3AD203B41FA5}">
                       <a16:colId xmlns:a16="http://schemas.microsoft.com/office/drawing/2014/main" val="315955252"/>
                     </a:ext>
                   </a:extLst>
                 </a:gridCol>
-                <a:gridCol w="724945">
+                <a:gridCol w="731520">
                   <a:extLst>
                     <a:ext uri="{9D8B030D-6E8A-4147-A177-3AD203B41FA5}">
                       <a16:colId xmlns:a16="http://schemas.microsoft.com/office/drawing/2014/main" val="4228990036"/>
                     </a:ext>
                   </a:extLst>
                 </a:gridCol>
-                <a:gridCol w="1009165">
+                <a:gridCol w="1005840">
                   <a:extLst>
                     <a:ext uri="{9D8B030D-6E8A-4147-A177-3AD203B41FA5}">
                       <a16:colId xmlns:a16="http://schemas.microsoft.com/office/drawing/2014/main" val="1645897651"/>
                     </a:ext>
                   </a:extLst>
                 </a:gridCol>
-                <a:gridCol w="1009165">
+                <a:gridCol w="966652">
                   <a:extLst>
                     <a:ext uri="{9D8B030D-6E8A-4147-A177-3AD203B41FA5}">
                       <a16:colId xmlns:a16="http://schemas.microsoft.com/office/drawing/2014/main" val="679647472"/>
@@ -12673,14 +12674,14 @@
           <p:nvPr>
             <p:extLst>
               <p:ext uri="{D42A27DB-BD31-4B8C-83A1-F6EECF244321}">
-                <p14:modId xmlns:p14="http://schemas.microsoft.com/office/powerpoint/2010/main" val="1344773199"/>
+                <p14:modId xmlns:p14="http://schemas.microsoft.com/office/powerpoint/2010/main" val="1401074952"/>
               </p:ext>
             </p:extLst>
           </p:nvPr>
         </p:nvGraphicFramePr>
         <p:xfrm>
           <a:off x="6502289" y="2786089"/>
-          <a:ext cx="3112433" cy="2403131"/>
+          <a:ext cx="2929094" cy="2403131"/>
         </p:xfrm>
         <a:graphic>
           <a:graphicData uri="http://schemas.openxmlformats.org/drawingml/2006/table">
@@ -12703,7 +12704,7 @@
                     </a:ext>
                   </a:extLst>
                 </a:gridCol>
-                <a:gridCol w="1323022">
+                <a:gridCol w="1139683">
                   <a:extLst>
                     <a:ext uri="{9D8B030D-6E8A-4147-A177-3AD203B41FA5}">
                       <a16:colId xmlns:a16="http://schemas.microsoft.com/office/drawing/2014/main" val="340182992"/>
@@ -13570,7 +13571,7 @@
         </p:nvSpPr>
         <p:spPr>
           <a:xfrm>
-            <a:off x="7726024" y="2259958"/>
+            <a:off x="7450185" y="2117071"/>
             <a:ext cx="1959429" cy="369332"/>
           </a:xfrm>
           <a:prstGeom prst="rect">
@@ -15614,7 +15615,7 @@
             </a:r>
             <a:r>
               <a:rPr lang="en-US" sz="2800" dirty="0"/>
-              <a:t> = clicks/log(views)</a:t>
+              <a:t> = clicks/sqrt(views)</a:t>
             </a:r>
           </a:p>
           <a:p>
@@ -15859,7 +15860,7 @@
           <a:p>
             <a:r>
               <a:rPr lang="en-US" dirty="0"/>
-              <a:t>Solutions</a:t>
+              <a:t>Problems and solutions</a:t>
             </a:r>
           </a:p>
         </p:txBody>
@@ -15895,13 +15896,263 @@
           <a:p>
             <a:r>
               <a:rPr lang="en-US" sz="2800" dirty="0"/>
-              <a:t>1. </a:t>
-            </a:r>
-          </a:p>
-          <a:p>
+              <a:t>When using </a:t>
+            </a:r>
+            <a:r>
+              <a:rPr lang="en-US" sz="2800" dirty="0" err="1"/>
+              <a:t>clicks_ratio</a:t>
+            </a:r>
             <a:r>
               <a:rPr lang="en-US" sz="2800" dirty="0"/>
-              <a:t>2. </a:t>
+              <a:t> = clicks/sqrt(views), the average views of the best 100 is about 10 times bigger than the total average</a:t>
+            </a:r>
+          </a:p>
+          <a:p>
+            <a:endParaRPr lang="en-US" sz="2800" dirty="0"/>
+          </a:p>
+          <a:p>
+            <a:r>
+              <a:rPr lang="en-US" sz="2800" i="1" dirty="0">
+                <a:solidFill>
+                  <a:srgbClr val="002060"/>
+                </a:solidFill>
+              </a:rPr>
+              <a:t>Solution</a:t>
+            </a:r>
+            <a:r>
+              <a:rPr lang="en-US" sz="2800" dirty="0"/>
+              <a:t>: Go back to use </a:t>
+            </a:r>
+            <a:r>
+              <a:rPr lang="en-US" sz="2800" dirty="0" err="1"/>
+              <a:t>clicks_ratio</a:t>
+            </a:r>
+            <a:r>
+              <a:rPr lang="en-US" sz="2800" dirty="0"/>
+              <a:t> = clicks/views</a:t>
+            </a:r>
+          </a:p>
+          <a:p>
+            <a:pPr marL="0" indent="0">
+              <a:buNone/>
+            </a:pPr>
+            <a:r>
+              <a:rPr lang="en-US" sz="2800" dirty="0"/>
+              <a:t>	than the average views of the best 100 is about 65% 	from the total average</a:t>
+            </a:r>
+          </a:p>
+        </p:txBody>
+      </p:sp>
+      <p:sp>
+        <p:nvSpPr>
+          <p:cNvPr id="4" name="מלבן 3">
+            <a:extLst>
+              <a:ext uri="{FF2B5EF4-FFF2-40B4-BE49-F238E27FC236}">
+                <a16:creationId xmlns:a16="http://schemas.microsoft.com/office/drawing/2014/main" id="{1A86B336-C0EA-4EFF-BDC2-055EDA49FE99}"/>
+              </a:ext>
+            </a:extLst>
+          </p:cNvPr>
+          <p:cNvSpPr/>
+          <p:nvPr/>
+        </p:nvSpPr>
+        <p:spPr>
+          <a:xfrm>
+            <a:off x="352697" y="143691"/>
+            <a:ext cx="1711234" cy="587829"/>
+          </a:xfrm>
+          <a:prstGeom prst="rect">
+            <a:avLst/>
+          </a:prstGeom>
+        </p:spPr>
+        <p:style>
+          <a:lnRef idx="2">
+            <a:schemeClr val="accent1">
+              <a:shade val="50000"/>
+            </a:schemeClr>
+          </a:lnRef>
+          <a:fillRef idx="1">
+            <a:schemeClr val="accent1"/>
+          </a:fillRef>
+          <a:effectRef idx="0">
+            <a:schemeClr val="accent1"/>
+          </a:effectRef>
+          <a:fontRef idx="minor">
+            <a:schemeClr val="lt1"/>
+          </a:fontRef>
+        </p:style>
+        <p:txBody>
+          <a:bodyPr rtlCol="0" anchor="ctr"/>
+          <a:lstStyle/>
+          <a:p>
+            <a:pPr algn="ctr"/>
+            <a:r>
+              <a:rPr lang="en-US" dirty="0"/>
+              <a:t>Q #2</a:t>
+            </a:r>
+          </a:p>
+        </p:txBody>
+      </p:sp>
+    </p:spTree>
+    <p:extLst>
+      <p:ext uri="{BB962C8B-B14F-4D97-AF65-F5344CB8AC3E}">
+        <p14:creationId xmlns:p14="http://schemas.microsoft.com/office/powerpoint/2010/main" val="4092067384"/>
+      </p:ext>
+    </p:extLst>
+  </p:cSld>
+  <p:clrMapOvr>
+    <a:masterClrMapping/>
+  </p:clrMapOvr>
+</p:sld>
+</file>
+
+<file path=ppt/slides/slide24.xml><?xml version="1.0" encoding="utf-8"?>
+<p:sld xmlns:a="http://schemas.openxmlformats.org/drawingml/2006/main" xmlns:r="http://schemas.openxmlformats.org/officeDocument/2006/relationships" xmlns:p="http://schemas.openxmlformats.org/presentationml/2006/main">
+  <p:cSld>
+    <p:spTree>
+      <p:nvGrpSpPr>
+        <p:cNvPr id="1" name=""/>
+        <p:cNvGrpSpPr/>
+        <p:nvPr/>
+      </p:nvGrpSpPr>
+      <p:grpSpPr>
+        <a:xfrm>
+          <a:off x="0" y="0"/>
+          <a:ext cx="0" cy="0"/>
+          <a:chOff x="0" y="0"/>
+          <a:chExt cx="0" cy="0"/>
+        </a:xfrm>
+      </p:grpSpPr>
+      <p:sp>
+        <p:nvSpPr>
+          <p:cNvPr id="2" name="כותרת 1">
+            <a:extLst>
+              <a:ext uri="{FF2B5EF4-FFF2-40B4-BE49-F238E27FC236}">
+                <a16:creationId xmlns:a16="http://schemas.microsoft.com/office/drawing/2014/main" id="{4DE571CE-2AFA-4C23-9F1D-51313B6EB326}"/>
+              </a:ext>
+            </a:extLst>
+          </p:cNvPr>
+          <p:cNvSpPr>
+            <a:spLocks noGrp="1"/>
+          </p:cNvSpPr>
+          <p:nvPr>
+            <p:ph type="title"/>
+          </p:nvPr>
+        </p:nvSpPr>
+        <p:spPr>
+          <a:xfrm>
+            <a:off x="1069848" y="484632"/>
+            <a:ext cx="10425466" cy="1609344"/>
+          </a:xfrm>
+        </p:spPr>
+        <p:txBody>
+          <a:bodyPr/>
+          <a:lstStyle/>
+          <a:p>
+            <a:r>
+              <a:rPr lang="en-US" dirty="0"/>
+              <a:t>To sum up</a:t>
+            </a:r>
+          </a:p>
+        </p:txBody>
+      </p:sp>
+      <p:sp>
+        <p:nvSpPr>
+          <p:cNvPr id="3" name="מציין מיקום תוכן 2">
+            <a:extLst>
+              <a:ext uri="{FF2B5EF4-FFF2-40B4-BE49-F238E27FC236}">
+                <a16:creationId xmlns:a16="http://schemas.microsoft.com/office/drawing/2014/main" id="{12D10953-719A-4D6F-A1DB-9F8CFF32E75B}"/>
+              </a:ext>
+            </a:extLst>
+          </p:cNvPr>
+          <p:cNvSpPr>
+            <a:spLocks noGrp="1"/>
+          </p:cNvSpPr>
+          <p:nvPr>
+            <p:ph idx="1"/>
+          </p:nvPr>
+        </p:nvSpPr>
+        <p:spPr/>
+        <p:txBody>
+          <a:bodyPr>
+            <a:normAutofit/>
+          </a:bodyPr>
+          <a:lstStyle/>
+          <a:p>
+            <a:r>
+              <a:rPr lang="en-US" sz="2400" dirty="0"/>
+              <a:t>Step 1: Read the segments data and calculate </a:t>
+            </a:r>
+            <a:r>
+              <a:rPr lang="en-US" sz="2400" dirty="0" err="1"/>
+              <a:t>clicks_ratio</a:t>
+            </a:r>
+            <a:r>
+              <a:rPr lang="en-US" sz="1600" dirty="0"/>
+              <a:t>(=clicks/views)</a:t>
+            </a:r>
+          </a:p>
+          <a:p>
+            <a:endParaRPr lang="en-US" sz="1600" dirty="0"/>
+          </a:p>
+          <a:p>
+            <a:r>
+              <a:rPr lang="en-US" sz="2400" dirty="0"/>
+              <a:t>Step 2: Create the “total” table using </a:t>
+            </a:r>
+            <a:r>
+              <a:rPr lang="en-US" sz="2400" dirty="0" err="1"/>
+              <a:t>groupby</a:t>
+            </a:r>
+            <a:endParaRPr lang="en-US" sz="2400" dirty="0"/>
+          </a:p>
+          <a:p>
+            <a:endParaRPr lang="en-US" sz="2400" dirty="0"/>
+          </a:p>
+          <a:p>
+            <a:r>
+              <a:rPr lang="en-US" sz="2400" dirty="0"/>
+              <a:t>Step 3: Calculate </a:t>
+            </a:r>
+            <a:r>
+              <a:rPr lang="en-US" sz="2400" dirty="0" err="1"/>
+              <a:t>click_rate</a:t>
+            </a:r>
+            <a:r>
+              <a:rPr lang="en-US" sz="1600" dirty="0"/>
+              <a:t>(=</a:t>
+            </a:r>
+            <a:r>
+              <a:rPr lang="en-US" sz="1600" dirty="0" err="1"/>
+              <a:t>segment_click_ratio</a:t>
+            </a:r>
+            <a:r>
+              <a:rPr lang="en-US" sz="1600" dirty="0"/>
+              <a:t>/</a:t>
+            </a:r>
+            <a:r>
+              <a:rPr lang="en-US" sz="1600" dirty="0" err="1"/>
+              <a:t>total_click_ratio</a:t>
+            </a:r>
+            <a:r>
+              <a:rPr lang="en-US" sz="1600" dirty="0"/>
+              <a:t>)</a:t>
+            </a:r>
+          </a:p>
+          <a:p>
+            <a:endParaRPr lang="en-US" sz="2400" dirty="0"/>
+          </a:p>
+          <a:p>
+            <a:r>
+              <a:rPr lang="en-US" sz="2400" dirty="0"/>
+              <a:t>Step 4: </a:t>
+            </a:r>
+            <a:r>
+              <a:rPr lang="en-US" sz="2400" dirty="0" err="1"/>
+              <a:t>Groupby</a:t>
+            </a:r>
+            <a:r>
+              <a:rPr lang="en-US" sz="2400" dirty="0"/>
+              <a:t> along the dates and sort </a:t>
             </a:r>
           </a:p>
         </p:txBody>

</xml_diff>